<commit_message>
Started work on weekly schedule
</commit_message>
<xml_diff>
--- a/doc/video-02-planning.pptx
+++ b/doc/video-02-planning.pptx
@@ -10257,6 +10257,208 @@
             <a:fld id="{18BDFEC3-8487-43E8-A154-7C12CBC1FFF2}" type="slidenum">
               <a:rPr lang="en-US"/>
               <a:t>25</a:t>
+            </a:fld>
+            <a:endParaRPr lang="en-US"/>
+          </a:p>
+        </p:txBody>
+      </p:sp>
+    </p:spTree>
+  </p:cSld>
+</p:notes>
+</file>
+
+<file path=ppt/notesSlides/notesSlide23.xml><?xml version="1.0" encoding="utf-8"?>
+<p:notes xmlns:a="http://schemas.openxmlformats.org/drawingml/2006/main" xmlns:r="http://schemas.openxmlformats.org/officeDocument/2006/relationships" xmlns:p="http://schemas.openxmlformats.org/presentationml/2006/main">
+  <p:cSld>
+    <p:spTree>
+      <p:nvGrpSpPr>
+        <p:cNvPr id="1" name=""/>
+        <p:cNvGrpSpPr/>
+        <p:nvPr/>
+      </p:nvGrpSpPr>
+      <p:grpSpPr>
+        <a:xfrm>
+          <a:off x="0" y="0"/>
+          <a:ext cx="0" cy="0"/>
+          <a:chOff x="0" y="0"/>
+          <a:chExt cx="0" cy="0"/>
+        </a:xfrm>
+      </p:grpSpPr>
+      <p:sp>
+        <p:nvSpPr>
+          <p:cNvPr id="2" name="Slide Image Placeholder 1"/>
+          <p:cNvSpPr>
+            <a:spLocks noGrp="1" noRot="1" noChangeAspect="1"/>
+          </p:cNvSpPr>
+          <p:nvPr>
+            <p:ph type="sldImg"/>
+          </p:nvPr>
+        </p:nvSpPr>
+        <p:spPr/>
+      </p:sp>
+      <p:sp>
+        <p:nvSpPr>
+          <p:cNvPr id="3" name="Notes Placeholder 2"/>
+          <p:cNvSpPr>
+            <a:spLocks noGrp="1"/>
+          </p:cNvSpPr>
+          <p:nvPr>
+            <p:ph type="body" idx="1"/>
+          </p:nvPr>
+        </p:nvSpPr>
+        <p:spPr/>
+        <p:txBody>
+          <a:bodyPr/>
+          <a:lstStyle/>
+          <a:p>
+            <a:pPr lvl="0" marL="0" indent="0">
+              <a:buNone/>
+            </a:pPr>
+            <a:r>
+              <a:rPr/>
+              <a:t>Due</a:t>
+            </a:r>
+            <a:r>
+              <a:rPr/>
+              <a:t> </a:t>
+            </a:r>
+            <a:r>
+              <a:rPr/>
+              <a:t>before</a:t>
+            </a:r>
+            <a:r>
+              <a:rPr/>
+              <a:t> </a:t>
+            </a:r>
+            <a:r>
+              <a:rPr/>
+              <a:t>the</a:t>
+            </a:r>
+            <a:r>
+              <a:rPr/>
+              <a:t> </a:t>
+            </a:r>
+            <a:r>
+              <a:rPr/>
+              <a:t>week</a:t>
+            </a:r>
+            <a:r>
+              <a:rPr/>
+              <a:t> </a:t>
+            </a:r>
+            <a:r>
+              <a:rPr/>
+              <a:t>3</a:t>
+            </a:r>
+            <a:r>
+              <a:rPr/>
+              <a:t> </a:t>
+            </a:r>
+            <a:r>
+              <a:rPr/>
+              <a:t>class</a:t>
+            </a:r>
+            <a:r>
+              <a:rPr/>
+              <a:t> </a:t>
+            </a:r>
+            <a:r>
+              <a:rPr/>
+              <a:t>session.</a:t>
+            </a:r>
+            <a:r>
+              <a:rPr/>
+              <a:t> </a:t>
+            </a:r>
+            <a:r>
+              <a:rPr/>
+              <a:t>If</a:t>
+            </a:r>
+            <a:r>
+              <a:rPr/>
+              <a:t> </a:t>
+            </a:r>
+            <a:r>
+              <a:rPr/>
+              <a:t>you</a:t>
+            </a:r>
+            <a:r>
+              <a:rPr/>
+              <a:t> </a:t>
+            </a:r>
+            <a:r>
+              <a:rPr/>
+              <a:t>have</a:t>
+            </a:r>
+            <a:r>
+              <a:rPr/>
+              <a:t> </a:t>
+            </a:r>
+            <a:r>
+              <a:rPr/>
+              <a:t>already</a:t>
+            </a:r>
+            <a:r>
+              <a:rPr/>
+              <a:t> </a:t>
+            </a:r>
+            <a:r>
+              <a:rPr/>
+              <a:t>completed</a:t>
+            </a:r>
+            <a:r>
+              <a:rPr/>
+              <a:t> </a:t>
+            </a:r>
+            <a:r>
+              <a:rPr/>
+              <a:t>this</a:t>
+            </a:r>
+            <a:r>
+              <a:rPr/>
+              <a:t> </a:t>
+            </a:r>
+            <a:r>
+              <a:rPr/>
+              <a:t>training,</a:t>
+            </a:r>
+            <a:r>
+              <a:rPr/>
+              <a:t> </a:t>
+            </a:r>
+            <a:r>
+              <a:rPr/>
+              <a:t>send</a:t>
+            </a:r>
+            <a:r>
+              <a:rPr/>
+              <a:t> </a:t>
+            </a:r>
+            <a:r>
+              <a:rPr/>
+              <a:t>documentation.</a:t>
+            </a:r>
+          </a:p>
+        </p:txBody>
+      </p:sp>
+      <p:sp>
+        <p:nvSpPr>
+          <p:cNvPr id="4" name="Slide Number Placeholder 3"/>
+          <p:cNvSpPr>
+            <a:spLocks noGrp="1"/>
+          </p:cNvSpPr>
+          <p:nvPr>
+            <p:ph type="sldNum" sz="quarter" idx="10"/>
+          </p:nvPr>
+        </p:nvSpPr>
+        <p:spPr/>
+        <p:txBody>
+          <a:bodyPr/>
+          <a:lstStyle/>
+          <a:p>
+            <a:fld id="{18BDFEC3-8487-43E8-A154-7C12CBC1FFF2}" type="slidenum">
+              <a:rPr lang="en-US"/>
+              <a:t>27</a:t>
             </a:fld>
             <a:endParaRPr lang="en-US"/>
           </a:p>
@@ -21624,14 +21826,14 @@
             <a:pPr lvl="2"/>
             <a:r>
               <a:rPr/>
-              <a:t>CITI training ? used by multiple institutions</a:t>
+              <a:t>CITI training - used by multiple institutions</a:t>
             </a:r>
           </a:p>
           <a:p>
             <a:pPr lvl="1"/>
             <a:r>
               <a:rPr/>
-              <a:t>IRBs ?</a:t>
+              <a:t>IRBs</a:t>
             </a:r>
           </a:p>
           <a:p>
@@ -21645,14 +21847,14 @@
             <a:pPr lvl="2"/>
             <a:r>
               <a:rPr/>
-              <a:t>IRBs at other institutions (CMH, St. Luke?s ?)</a:t>
+              <a:t>IRBs at other institutions (CMH, St. Luke’s)</a:t>
             </a:r>
           </a:p>
           <a:p>
             <a:pPr lvl="1"/>
             <a:r>
               <a:rPr/>
-              <a:t>Research committees ?</a:t>
+              <a:t>Research committees</a:t>
             </a:r>
           </a:p>
         </p:txBody>
@@ -21744,63 +21946,53 @@
             <a:pPr lvl="1"/>
             <a:r>
               <a:rPr>
-                <a:hlinkClick r:id="rId2"/>
+                <a:hlinkClick r:id="rId3"/>
               </a:rPr>
               <a:t>http://www.umkc.edu/ors/irb/training.cfm</a:t>
             </a:r>
           </a:p>
           <a:p>
             <a:pPr lvl="1"/>
-            <a:r>
-              <a:rPr>
-                <a:hlinkClick r:id="rId3"/>
-              </a:rPr>
-              <a:t>http://www.citiprogram.org/</a:t>
-            </a:r>
-          </a:p>
-          <a:p>
-            <a:pPr lvl="1"/>
-            <a:r>
-              <a:rPr/>
-              <a:t>Select ?Group 1 ? Biomedical Investigator?</a:t>
-            </a:r>
-          </a:p>
-          <a:p>
-            <a:pPr lvl="1"/>
-            <a:r>
-              <a:rPr/>
-              <a:t>Send a copy of the Certificate of Completion to Dr. Gerkovich ( </a:t>
-            </a:r>
             <a:r>
               <a:rPr>
                 <a:hlinkClick r:id="rId4"/>
               </a:rPr>
-              <a:t>gerkovichm@umkc.edu</a:t>
-            </a:r>
-            <a:r>
-              <a:rPr/>
-              <a:t> ); this copy will be kept by me so make sure to also print out a copy for your own file.</a:t>
-            </a:r>
-          </a:p>
-          <a:p>
-            <a:pPr lvl="0" marL="0" indent="0">
-              <a:buNone/>
-            </a:pPr>
+              <a:t>http://www.citiprogram.org/</a:t>
+            </a:r>
+          </a:p>
+          <a:p>
+            <a:pPr lvl="1"/>
+            <a:r>
+              <a:rPr/>
+              <a:t>Select Group 1 Biomedical Investigator</a:t>
+            </a:r>
+          </a:p>
+          <a:p>
+            <a:pPr lvl="1"/>
+            <a:r>
+              <a:rPr/>
+              <a:t>Send a copy of the Certificate of Completion to Dr. Simon (</a:t>
+            </a:r>
             <a:r>
               <a:rPr>
                 <a:hlinkClick r:id="rId5"/>
               </a:rPr>
-              <a:t>http://www.umkc.edu/ors/irb/training.cfm</a:t>
-            </a:r>
-            <a:r>
-              <a:rPr/>
-              <a:t> </a:t>
-            </a:r>
+              <a:t>simons@umkc.edu</a:t>
+            </a:r>
+            <a:r>
+              <a:rPr/>
+              <a:t> ); this copy will be kept by me so make sure to also print out a copy for your own file.</a:t>
+            </a:r>
+          </a:p>
+          <a:p>
+            <a:pPr lvl="0" marL="0" indent="0">
+              <a:buNone/>
+            </a:pPr>
             <a:r>
               <a:rPr>
                 <a:hlinkClick r:id="rId6"/>
               </a:rPr>
-              <a:t>http://www.citiprogram.org/</a:t>
+              <a:t>http://www.umkc.edu/ors/irb/training.cfm</a:t>
             </a:r>
             <a:r>
               <a:rPr/>
@@ -21809,6 +22001,16 @@
             <a:r>
               <a:rPr>
                 <a:hlinkClick r:id="rId7"/>
+              </a:rPr>
+              <a:t>http://www.citiprogram.org/</a:t>
+            </a:r>
+            <a:r>
+              <a:rPr/>
+              <a:t> </a:t>
+            </a:r>
+            <a:r>
+              <a:rPr>
+                <a:hlinkClick r:id="rId8"/>
               </a:rPr>
               <a:t>gerkovichm@umkc.edu</a:t>
             </a:r>
@@ -22605,7 +22807,23 @@
             </a:pPr>
             <a:r>
               <a:rPr/>
-              <a:t>Planning</a:t>
+              <a:t>Considerations</a:t>
+            </a:r>
+            <a:r>
+              <a:rPr/>
+              <a:t> </a:t>
+            </a:r>
+            <a:r>
+              <a:rPr/>
+              <a:t>in</a:t>
+            </a:r>
+            <a:r>
+              <a:rPr/>
+              <a:t> </a:t>
+            </a:r>
+            <a:r>
+              <a:rPr/>
+              <a:t>Choosing</a:t>
             </a:r>
             <a:r>
               <a:rPr/>
@@ -22621,15 +22839,7 @@
             </a:r>
             <a:r>
               <a:rPr/>
-              <a:t>Research</a:t>
-            </a:r>
-            <a:r>
-              <a:rPr/>
-              <a:t> </a:t>
-            </a:r>
-            <a:r>
-              <a:rPr/>
-              <a:t>Project</a:t>
+              <a:t>Topic</a:t>
             </a:r>
           </a:p>
         </p:txBody>
@@ -22652,83 +22862,67 @@
             <a:pPr lvl="1"/>
             <a:r>
               <a:rPr/>
-              <a:t>Considerations in Choosing a Topic</a:t>
+              <a:t>Interest and enthusiasm</a:t>
+            </a:r>
+          </a:p>
+          <a:p>
+            <a:pPr lvl="1"/>
+            <a:r>
+              <a:rPr/>
+              <a:t>Time/Cost</a:t>
+            </a:r>
+          </a:p>
+          <a:p>
+            <a:pPr lvl="1"/>
+            <a:r>
+              <a:rPr/>
+              <a:t>Scope of the problem</a:t>
+            </a:r>
+          </a:p>
+          <a:p>
+            <a:pPr lvl="1"/>
+            <a:r>
+              <a:rPr/>
+              <a:t>Contribution to the profession</a:t>
+            </a:r>
+          </a:p>
+          <a:p>
+            <a:pPr lvl="1"/>
+            <a:r>
+              <a:rPr/>
+              <a:t>Support and expertise</a:t>
+            </a:r>
+          </a:p>
+          <a:p>
+            <a:pPr lvl="1"/>
+            <a:r>
+              <a:rPr/>
+              <a:t>Access issues/human subjects</a:t>
+            </a:r>
+          </a:p>
+          <a:p>
+            <a:pPr lvl="1"/>
+            <a:r>
+              <a:rPr/>
+              <a:t>Degree of control</a:t>
+            </a:r>
+          </a:p>
+          <a:p>
+            <a:pPr lvl="1"/>
+            <a:r>
+              <a:rPr/>
+              <a:t>Design considerations</a:t>
+            </a:r>
+          </a:p>
+          <a:p>
+            <a:pPr lvl="1"/>
+            <a:r>
+              <a:rPr/>
+              <a:t>Values and comfort level of the researcher</a:t>
             </a:r>
           </a:p>
           <a:p>
             <a:pPr lvl="2"/>
-            <a:r>
-              <a:rPr/>
-              <a:t>Interest and enthusiasm</a:t>
-            </a:r>
-          </a:p>
-          <a:p>
-            <a:pPr lvl="2"/>
-            <a:r>
-              <a:rPr/>
-              <a:t>Time</a:t>
-            </a:r>
-          </a:p>
-          <a:p>
-            <a:pPr lvl="2"/>
-            <a:r>
-              <a:rPr/>
-              <a:t>Cost</a:t>
-            </a:r>
-          </a:p>
-          <a:p>
-            <a:pPr lvl="2"/>
-            <a:r>
-              <a:rPr/>
-              <a:t>Scope of the problem</a:t>
-            </a:r>
-          </a:p>
-          <a:p>
-            <a:pPr lvl="2"/>
-            <a:r>
-              <a:rPr/>
-              <a:t>Contribution to the profession</a:t>
-            </a:r>
-          </a:p>
-          <a:p>
-            <a:pPr lvl="2"/>
-            <a:r>
-              <a:rPr/>
-              <a:t>Support and expertise</a:t>
-            </a:r>
-          </a:p>
-          <a:p>
-            <a:pPr lvl="2"/>
-            <a:r>
-              <a:rPr/>
-              <a:t>Access issues/human subjects</a:t>
-            </a:r>
-          </a:p>
-          <a:p>
-            <a:pPr lvl="2"/>
-            <a:r>
-              <a:rPr/>
-              <a:t>Degree of control</a:t>
-            </a:r>
-          </a:p>
-          <a:p>
-            <a:pPr lvl="2"/>
-            <a:r>
-              <a:rPr/>
-              <a:t>Design considerations</a:t>
-            </a:r>
-          </a:p>
-          <a:p>
-            <a:pPr lvl="2"/>
-            <a:r>
-              <a:rPr/>
-              <a:t>Values and comfort level of the researcher</a:t>
-            </a:r>
-          </a:p>
-          <a:p>
-            <a:pPr lvl="0" marL="0" indent="0">
-              <a:buNone/>
-            </a:pPr>
             <a:r>
               <a:rPr/>
               <a:t>Cottrell &amp; McKenzie. </a:t>

</xml_diff>